<commit_message>
add x-axis label to figures
</commit_message>
<xml_diff>
--- a/figfig.pptx
+++ b/figfig.pptx
@@ -6,6 +6,11 @@
   </p:sldMasterIdLst>
   <p:sldIdLst>
     <p:sldId id="256" r:id="rId2"/>
+    <p:sldId id="257" r:id="rId3"/>
+    <p:sldId id="258" r:id="rId4"/>
+    <p:sldId id="259" r:id="rId5"/>
+    <p:sldId id="260" r:id="rId6"/>
+    <p:sldId id="261" r:id="rId7"/>
   </p:sldIdLst>
   <p:sldSz cx="12192000" cy="6858000"/>
   <p:notesSz cx="6858000" cy="9144000"/>
@@ -243,7 +248,7 @@
           <a:p>
             <a:fld id="{05A35C30-41E7-439A-B738-DAB5A3BF7A6C}" type="datetimeFigureOut">
               <a:rPr lang="ko-KR" altLang="en-US" smtClean="0"/>
-              <a:t>2018-04-24</a:t>
+              <a:t>2018. 6. 15.</a:t>
             </a:fld>
             <a:endParaRPr lang="ko-KR" altLang="en-US"/>
           </a:p>
@@ -413,7 +418,7 @@
           <a:p>
             <a:fld id="{05A35C30-41E7-439A-B738-DAB5A3BF7A6C}" type="datetimeFigureOut">
               <a:rPr lang="ko-KR" altLang="en-US" smtClean="0"/>
-              <a:t>2018-04-24</a:t>
+              <a:t>2018. 6. 15.</a:t>
             </a:fld>
             <a:endParaRPr lang="ko-KR" altLang="en-US"/>
           </a:p>
@@ -593,7 +598,7 @@
           <a:p>
             <a:fld id="{05A35C30-41E7-439A-B738-DAB5A3BF7A6C}" type="datetimeFigureOut">
               <a:rPr lang="ko-KR" altLang="en-US" smtClean="0"/>
-              <a:t>2018-04-24</a:t>
+              <a:t>2018. 6. 15.</a:t>
             </a:fld>
             <a:endParaRPr lang="ko-KR" altLang="en-US"/>
           </a:p>
@@ -763,7 +768,7 @@
           <a:p>
             <a:fld id="{05A35C30-41E7-439A-B738-DAB5A3BF7A6C}" type="datetimeFigureOut">
               <a:rPr lang="ko-KR" altLang="en-US" smtClean="0"/>
-              <a:t>2018-04-24</a:t>
+              <a:t>2018. 6. 15.</a:t>
             </a:fld>
             <a:endParaRPr lang="ko-KR" altLang="en-US"/>
           </a:p>
@@ -1009,7 +1014,7 @@
           <a:p>
             <a:fld id="{05A35C30-41E7-439A-B738-DAB5A3BF7A6C}" type="datetimeFigureOut">
               <a:rPr lang="ko-KR" altLang="en-US" smtClean="0"/>
-              <a:t>2018-04-24</a:t>
+              <a:t>2018. 6. 15.</a:t>
             </a:fld>
             <a:endParaRPr lang="ko-KR" altLang="en-US"/>
           </a:p>
@@ -1241,7 +1246,7 @@
           <a:p>
             <a:fld id="{05A35C30-41E7-439A-B738-DAB5A3BF7A6C}" type="datetimeFigureOut">
               <a:rPr lang="ko-KR" altLang="en-US" smtClean="0"/>
-              <a:t>2018-04-24</a:t>
+              <a:t>2018. 6. 15.</a:t>
             </a:fld>
             <a:endParaRPr lang="ko-KR" altLang="en-US"/>
           </a:p>
@@ -1608,7 +1613,7 @@
           <a:p>
             <a:fld id="{05A35C30-41E7-439A-B738-DAB5A3BF7A6C}" type="datetimeFigureOut">
               <a:rPr lang="ko-KR" altLang="en-US" smtClean="0"/>
-              <a:t>2018-04-24</a:t>
+              <a:t>2018. 6. 15.</a:t>
             </a:fld>
             <a:endParaRPr lang="ko-KR" altLang="en-US"/>
           </a:p>
@@ -1726,7 +1731,7 @@
           <a:p>
             <a:fld id="{05A35C30-41E7-439A-B738-DAB5A3BF7A6C}" type="datetimeFigureOut">
               <a:rPr lang="ko-KR" altLang="en-US" smtClean="0"/>
-              <a:t>2018-04-24</a:t>
+              <a:t>2018. 6. 15.</a:t>
             </a:fld>
             <a:endParaRPr lang="ko-KR" altLang="en-US"/>
           </a:p>
@@ -1821,7 +1826,7 @@
           <a:p>
             <a:fld id="{05A35C30-41E7-439A-B738-DAB5A3BF7A6C}" type="datetimeFigureOut">
               <a:rPr lang="ko-KR" altLang="en-US" smtClean="0"/>
-              <a:t>2018-04-24</a:t>
+              <a:t>2018. 6. 15.</a:t>
             </a:fld>
             <a:endParaRPr lang="ko-KR" altLang="en-US"/>
           </a:p>
@@ -2098,7 +2103,7 @@
           <a:p>
             <a:fld id="{05A35C30-41E7-439A-B738-DAB5A3BF7A6C}" type="datetimeFigureOut">
               <a:rPr lang="ko-KR" altLang="en-US" smtClean="0"/>
-              <a:t>2018-04-24</a:t>
+              <a:t>2018. 6. 15.</a:t>
             </a:fld>
             <a:endParaRPr lang="ko-KR" altLang="en-US"/>
           </a:p>
@@ -2351,7 +2356,7 @@
           <a:p>
             <a:fld id="{05A35C30-41E7-439A-B738-DAB5A3BF7A6C}" type="datetimeFigureOut">
               <a:rPr lang="ko-KR" altLang="en-US" smtClean="0"/>
-              <a:t>2018-04-24</a:t>
+              <a:t>2018. 6. 15.</a:t>
             </a:fld>
             <a:endParaRPr lang="ko-KR" altLang="en-US"/>
           </a:p>
@@ -2564,7 +2569,7 @@
           <a:p>
             <a:fld id="{05A35C30-41E7-439A-B738-DAB5A3BF7A6C}" type="datetimeFigureOut">
               <a:rPr lang="ko-KR" altLang="en-US" smtClean="0"/>
-              <a:t>2018-04-24</a:t>
+              <a:t>2018. 6. 15.</a:t>
             </a:fld>
             <a:endParaRPr lang="ko-KR" altLang="en-US"/>
           </a:p>
@@ -5272,6 +5277,948 @@
 </p:sld>
 </file>
 
+<file path=ppt/slides/slide2.xml><?xml version="1.0" encoding="utf-8"?>
+<p:sld xmlns:a="http://schemas.openxmlformats.org/drawingml/2006/main" xmlns:r="http://schemas.openxmlformats.org/officeDocument/2006/relationships" xmlns:p="http://schemas.openxmlformats.org/presentationml/2006/main">
+  <p:cSld>
+    <p:spTree>
+      <p:nvGrpSpPr>
+        <p:cNvPr id="1" name=""/>
+        <p:cNvGrpSpPr/>
+        <p:nvPr/>
+      </p:nvGrpSpPr>
+      <p:grpSpPr>
+        <a:xfrm>
+          <a:off x="0" y="0"/>
+          <a:ext cx="0" cy="0"/>
+          <a:chOff x="0" y="0"/>
+          <a:chExt cx="0" cy="0"/>
+        </a:xfrm>
+      </p:grpSpPr>
+      <p:pic>
+        <p:nvPicPr>
+          <p:cNvPr id="4" name="그림 3"/>
+          <p:cNvPicPr>
+            <a:picLocks noChangeAspect="1"/>
+          </p:cNvPicPr>
+          <p:nvPr/>
+        </p:nvPicPr>
+        <p:blipFill>
+          <a:blip r:embed="rId2">
+            <a:extLst>
+              <a:ext uri="{28A0092B-C50C-407E-A947-70E740481C1C}">
+                <a14:useLocalDpi xmlns:a14="http://schemas.microsoft.com/office/drawing/2010/main" val="0"/>
+              </a:ext>
+            </a:extLst>
+          </a:blip>
+          <a:stretch>
+            <a:fillRect/>
+          </a:stretch>
+        </p:blipFill>
+        <p:spPr>
+          <a:xfrm>
+            <a:off x="877208" y="1222828"/>
+            <a:ext cx="4254500" cy="4064000"/>
+          </a:xfrm>
+          <a:prstGeom prst="rect">
+            <a:avLst/>
+          </a:prstGeom>
+        </p:spPr>
+      </p:pic>
+      <p:pic>
+        <p:nvPicPr>
+          <p:cNvPr id="8" name="그림 7"/>
+          <p:cNvPicPr>
+            <a:picLocks noChangeAspect="1"/>
+          </p:cNvPicPr>
+          <p:nvPr/>
+        </p:nvPicPr>
+        <p:blipFill>
+          <a:blip r:embed="rId3">
+            <a:extLst>
+              <a:ext uri="{28A0092B-C50C-407E-A947-70E740481C1C}">
+                <a14:useLocalDpi xmlns:a14="http://schemas.microsoft.com/office/drawing/2010/main" val="0"/>
+              </a:ext>
+            </a:extLst>
+          </a:blip>
+          <a:stretch>
+            <a:fillRect/>
+          </a:stretch>
+        </p:blipFill>
+        <p:spPr>
+          <a:xfrm>
+            <a:off x="6366330" y="1222828"/>
+            <a:ext cx="4178300" cy="4064000"/>
+          </a:xfrm>
+          <a:prstGeom prst="rect">
+            <a:avLst/>
+          </a:prstGeom>
+        </p:spPr>
+      </p:pic>
+      <p:sp>
+        <p:nvSpPr>
+          <p:cNvPr id="9" name="직사각형 8"/>
+          <p:cNvSpPr/>
+          <p:nvPr/>
+        </p:nvSpPr>
+        <p:spPr>
+          <a:xfrm>
+            <a:off x="1817915" y="5085441"/>
+            <a:ext cx="2895600" cy="293914"/>
+          </a:xfrm>
+          <a:prstGeom prst="rect">
+            <a:avLst/>
+          </a:prstGeom>
+          <a:solidFill>
+            <a:schemeClr val="bg1"/>
+          </a:solidFill>
+          <a:ln>
+            <a:noFill/>
+          </a:ln>
+        </p:spPr>
+        <p:style>
+          <a:lnRef idx="2">
+            <a:schemeClr val="accent1">
+              <a:shade val="50000"/>
+            </a:schemeClr>
+          </a:lnRef>
+          <a:fillRef idx="1">
+            <a:schemeClr val="accent1"/>
+          </a:fillRef>
+          <a:effectRef idx="0">
+            <a:schemeClr val="accent1"/>
+          </a:effectRef>
+          <a:fontRef idx="minor">
+            <a:schemeClr val="lt1"/>
+          </a:fontRef>
+        </p:style>
+        <p:txBody>
+          <a:bodyPr rtlCol="0" anchor="ctr"/>
+          <a:lstStyle/>
+          <a:p>
+            <a:pPr algn="ctr"/>
+            <a:r>
+              <a:rPr kumimoji="1" lang="en-US" altLang="ko-KR" sz="1200" dirty="0" smtClean="0">
+                <a:solidFill>
+                  <a:schemeClr val="tx1"/>
+                </a:solidFill>
+              </a:rPr>
+              <a:t>access count ranking</a:t>
+            </a:r>
+            <a:endParaRPr kumimoji="1" lang="ko-KR" altLang="en-US" sz="1200" dirty="0">
+              <a:solidFill>
+                <a:schemeClr val="tx1"/>
+              </a:solidFill>
+            </a:endParaRPr>
+          </a:p>
+        </p:txBody>
+      </p:sp>
+      <p:sp>
+        <p:nvSpPr>
+          <p:cNvPr id="10" name="직사각형 9"/>
+          <p:cNvSpPr/>
+          <p:nvPr/>
+        </p:nvSpPr>
+        <p:spPr>
+          <a:xfrm>
+            <a:off x="7271656" y="5085441"/>
+            <a:ext cx="2895600" cy="293914"/>
+          </a:xfrm>
+          <a:prstGeom prst="rect">
+            <a:avLst/>
+          </a:prstGeom>
+          <a:solidFill>
+            <a:schemeClr val="bg1"/>
+          </a:solidFill>
+          <a:ln>
+            <a:noFill/>
+          </a:ln>
+        </p:spPr>
+        <p:style>
+          <a:lnRef idx="2">
+            <a:schemeClr val="accent1">
+              <a:shade val="50000"/>
+            </a:schemeClr>
+          </a:lnRef>
+          <a:fillRef idx="1">
+            <a:schemeClr val="accent1"/>
+          </a:fillRef>
+          <a:effectRef idx="0">
+            <a:schemeClr val="accent1"/>
+          </a:effectRef>
+          <a:fontRef idx="minor">
+            <a:schemeClr val="lt1"/>
+          </a:fontRef>
+        </p:style>
+        <p:txBody>
+          <a:bodyPr rtlCol="0" anchor="ctr"/>
+          <a:lstStyle/>
+          <a:p>
+            <a:pPr algn="ctr"/>
+            <a:r>
+              <a:rPr kumimoji="1" lang="en-US" altLang="ko-KR" sz="1200" dirty="0" smtClean="0">
+                <a:solidFill>
+                  <a:schemeClr val="tx1"/>
+                </a:solidFill>
+              </a:rPr>
+              <a:t>access count ranking</a:t>
+            </a:r>
+            <a:endParaRPr kumimoji="1" lang="ko-KR" altLang="en-US" sz="1200" dirty="0">
+              <a:solidFill>
+                <a:schemeClr val="tx1"/>
+              </a:solidFill>
+            </a:endParaRPr>
+          </a:p>
+        </p:txBody>
+      </p:sp>
+    </p:spTree>
+    <p:extLst>
+      <p:ext uri="{BB962C8B-B14F-4D97-AF65-F5344CB8AC3E}">
+        <p14:creationId xmlns:p14="http://schemas.microsoft.com/office/powerpoint/2010/main" val="1035592802"/>
+      </p:ext>
+    </p:extLst>
+  </p:cSld>
+  <p:clrMapOvr>
+    <a:masterClrMapping/>
+  </p:clrMapOvr>
+</p:sld>
+</file>
+
+<file path=ppt/slides/slide3.xml><?xml version="1.0" encoding="utf-8"?>
+<p:sld xmlns:a="http://schemas.openxmlformats.org/drawingml/2006/main" xmlns:r="http://schemas.openxmlformats.org/officeDocument/2006/relationships" xmlns:p="http://schemas.openxmlformats.org/presentationml/2006/main">
+  <p:cSld>
+    <p:spTree>
+      <p:nvGrpSpPr>
+        <p:cNvPr id="1" name=""/>
+        <p:cNvGrpSpPr/>
+        <p:nvPr/>
+      </p:nvGrpSpPr>
+      <p:grpSpPr>
+        <a:xfrm>
+          <a:off x="0" y="0"/>
+          <a:ext cx="0" cy="0"/>
+          <a:chOff x="0" y="0"/>
+          <a:chExt cx="0" cy="0"/>
+        </a:xfrm>
+      </p:grpSpPr>
+      <p:pic>
+        <p:nvPicPr>
+          <p:cNvPr id="4" name="그림 3"/>
+          <p:cNvPicPr>
+            <a:picLocks noChangeAspect="1"/>
+          </p:cNvPicPr>
+          <p:nvPr/>
+        </p:nvPicPr>
+        <p:blipFill>
+          <a:blip r:embed="rId2">
+            <a:extLst>
+              <a:ext uri="{28A0092B-C50C-407E-A947-70E740481C1C}">
+                <a14:useLocalDpi xmlns:a14="http://schemas.microsoft.com/office/drawing/2010/main" val="0"/>
+              </a:ext>
+            </a:extLst>
+          </a:blip>
+          <a:stretch>
+            <a:fillRect/>
+          </a:stretch>
+        </p:blipFill>
+        <p:spPr>
+          <a:xfrm>
+            <a:off x="1021444" y="798285"/>
+            <a:ext cx="4013200" cy="4064000"/>
+          </a:xfrm>
+          <a:prstGeom prst="rect">
+            <a:avLst/>
+          </a:prstGeom>
+        </p:spPr>
+      </p:pic>
+      <p:pic>
+        <p:nvPicPr>
+          <p:cNvPr id="5" name="그림 4"/>
+          <p:cNvPicPr>
+            <a:picLocks noChangeAspect="1"/>
+          </p:cNvPicPr>
+          <p:nvPr/>
+        </p:nvPicPr>
+        <p:blipFill>
+          <a:blip r:embed="rId3">
+            <a:extLst>
+              <a:ext uri="{28A0092B-C50C-407E-A947-70E740481C1C}">
+                <a14:useLocalDpi xmlns:a14="http://schemas.microsoft.com/office/drawing/2010/main" val="0"/>
+              </a:ext>
+            </a:extLst>
+          </a:blip>
+          <a:stretch>
+            <a:fillRect/>
+          </a:stretch>
+        </p:blipFill>
+        <p:spPr>
+          <a:xfrm>
+            <a:off x="6682015" y="798285"/>
+            <a:ext cx="4140200" cy="4064000"/>
+          </a:xfrm>
+          <a:prstGeom prst="rect">
+            <a:avLst/>
+          </a:prstGeom>
+        </p:spPr>
+      </p:pic>
+      <p:sp>
+        <p:nvSpPr>
+          <p:cNvPr id="6" name="직사각형 5"/>
+          <p:cNvSpPr/>
+          <p:nvPr/>
+        </p:nvSpPr>
+        <p:spPr>
+          <a:xfrm>
+            <a:off x="1687287" y="4660898"/>
+            <a:ext cx="2895600" cy="293914"/>
+          </a:xfrm>
+          <a:prstGeom prst="rect">
+            <a:avLst/>
+          </a:prstGeom>
+          <a:solidFill>
+            <a:schemeClr val="bg1"/>
+          </a:solidFill>
+          <a:ln>
+            <a:noFill/>
+          </a:ln>
+        </p:spPr>
+        <p:style>
+          <a:lnRef idx="2">
+            <a:schemeClr val="accent1">
+              <a:shade val="50000"/>
+            </a:schemeClr>
+          </a:lnRef>
+          <a:fillRef idx="1">
+            <a:schemeClr val="accent1"/>
+          </a:fillRef>
+          <a:effectRef idx="0">
+            <a:schemeClr val="accent1"/>
+          </a:effectRef>
+          <a:fontRef idx="minor">
+            <a:schemeClr val="lt1"/>
+          </a:fontRef>
+        </p:style>
+        <p:txBody>
+          <a:bodyPr rtlCol="0" anchor="ctr"/>
+          <a:lstStyle/>
+          <a:p>
+            <a:pPr algn="ctr"/>
+            <a:r>
+              <a:rPr kumimoji="1" lang="en-US" altLang="ko-KR" sz="1200" dirty="0" smtClean="0">
+                <a:solidFill>
+                  <a:schemeClr val="tx1"/>
+                </a:solidFill>
+              </a:rPr>
+              <a:t>access count ranking</a:t>
+            </a:r>
+            <a:endParaRPr kumimoji="1" lang="ko-KR" altLang="en-US" sz="1200" dirty="0">
+              <a:solidFill>
+                <a:schemeClr val="tx1"/>
+              </a:solidFill>
+            </a:endParaRPr>
+          </a:p>
+        </p:txBody>
+      </p:sp>
+      <p:sp>
+        <p:nvSpPr>
+          <p:cNvPr id="7" name="직사각형 6"/>
+          <p:cNvSpPr/>
+          <p:nvPr/>
+        </p:nvSpPr>
+        <p:spPr>
+          <a:xfrm>
+            <a:off x="7445830" y="4655451"/>
+            <a:ext cx="2895600" cy="293914"/>
+          </a:xfrm>
+          <a:prstGeom prst="rect">
+            <a:avLst/>
+          </a:prstGeom>
+          <a:solidFill>
+            <a:schemeClr val="bg1"/>
+          </a:solidFill>
+          <a:ln>
+            <a:noFill/>
+          </a:ln>
+        </p:spPr>
+        <p:style>
+          <a:lnRef idx="2">
+            <a:schemeClr val="accent1">
+              <a:shade val="50000"/>
+            </a:schemeClr>
+          </a:lnRef>
+          <a:fillRef idx="1">
+            <a:schemeClr val="accent1"/>
+          </a:fillRef>
+          <a:effectRef idx="0">
+            <a:schemeClr val="accent1"/>
+          </a:effectRef>
+          <a:fontRef idx="minor">
+            <a:schemeClr val="lt1"/>
+          </a:fontRef>
+        </p:style>
+        <p:txBody>
+          <a:bodyPr rtlCol="0" anchor="ctr"/>
+          <a:lstStyle/>
+          <a:p>
+            <a:pPr algn="ctr"/>
+            <a:r>
+              <a:rPr kumimoji="1" lang="en-US" altLang="ko-KR" sz="1200" dirty="0" smtClean="0">
+                <a:solidFill>
+                  <a:schemeClr val="tx1"/>
+                </a:solidFill>
+              </a:rPr>
+              <a:t>access count ranking</a:t>
+            </a:r>
+            <a:endParaRPr kumimoji="1" lang="ko-KR" altLang="en-US" sz="1200" dirty="0">
+              <a:solidFill>
+                <a:schemeClr val="tx1"/>
+              </a:solidFill>
+            </a:endParaRPr>
+          </a:p>
+        </p:txBody>
+      </p:sp>
+    </p:spTree>
+    <p:extLst>
+      <p:ext uri="{BB962C8B-B14F-4D97-AF65-F5344CB8AC3E}">
+        <p14:creationId xmlns:p14="http://schemas.microsoft.com/office/powerpoint/2010/main" val="1744159368"/>
+      </p:ext>
+    </p:extLst>
+  </p:cSld>
+  <p:clrMapOvr>
+    <a:masterClrMapping/>
+  </p:clrMapOvr>
+</p:sld>
+</file>
+
+<file path=ppt/slides/slide4.xml><?xml version="1.0" encoding="utf-8"?>
+<p:sld xmlns:a="http://schemas.openxmlformats.org/drawingml/2006/main" xmlns:r="http://schemas.openxmlformats.org/officeDocument/2006/relationships" xmlns:p="http://schemas.openxmlformats.org/presentationml/2006/main">
+  <p:cSld>
+    <p:spTree>
+      <p:nvGrpSpPr>
+        <p:cNvPr id="1" name=""/>
+        <p:cNvGrpSpPr/>
+        <p:nvPr/>
+      </p:nvGrpSpPr>
+      <p:grpSpPr>
+        <a:xfrm>
+          <a:off x="0" y="0"/>
+          <a:ext cx="0" cy="0"/>
+          <a:chOff x="0" y="0"/>
+          <a:chExt cx="0" cy="0"/>
+        </a:xfrm>
+      </p:grpSpPr>
+      <p:pic>
+        <p:nvPicPr>
+          <p:cNvPr id="4" name="그림 3"/>
+          <p:cNvPicPr>
+            <a:picLocks noChangeAspect="1"/>
+          </p:cNvPicPr>
+          <p:nvPr/>
+        </p:nvPicPr>
+        <p:blipFill>
+          <a:blip r:embed="rId2">
+            <a:extLst>
+              <a:ext uri="{28A0092B-C50C-407E-A947-70E740481C1C}">
+                <a14:useLocalDpi xmlns:a14="http://schemas.microsoft.com/office/drawing/2010/main" val="0"/>
+              </a:ext>
+            </a:extLst>
+          </a:blip>
+          <a:stretch>
+            <a:fillRect/>
+          </a:stretch>
+        </p:blipFill>
+        <p:spPr>
+          <a:xfrm>
+            <a:off x="3644900" y="1828800"/>
+            <a:ext cx="4889500" cy="3200400"/>
+          </a:xfrm>
+          <a:prstGeom prst="rect">
+            <a:avLst/>
+          </a:prstGeom>
+        </p:spPr>
+      </p:pic>
+      <p:sp>
+        <p:nvSpPr>
+          <p:cNvPr id="5" name="직사각형 4"/>
+          <p:cNvSpPr/>
+          <p:nvPr/>
+        </p:nvSpPr>
+        <p:spPr>
+          <a:xfrm>
+            <a:off x="4735286" y="5029200"/>
+            <a:ext cx="2895600" cy="293914"/>
+          </a:xfrm>
+          <a:prstGeom prst="rect">
+            <a:avLst/>
+          </a:prstGeom>
+          <a:solidFill>
+            <a:schemeClr val="bg1"/>
+          </a:solidFill>
+          <a:ln>
+            <a:noFill/>
+          </a:ln>
+        </p:spPr>
+        <p:style>
+          <a:lnRef idx="2">
+            <a:schemeClr val="accent1">
+              <a:shade val="50000"/>
+            </a:schemeClr>
+          </a:lnRef>
+          <a:fillRef idx="1">
+            <a:schemeClr val="accent1"/>
+          </a:fillRef>
+          <a:effectRef idx="0">
+            <a:schemeClr val="accent1"/>
+          </a:effectRef>
+          <a:fontRef idx="minor">
+            <a:schemeClr val="lt1"/>
+          </a:fontRef>
+        </p:style>
+        <p:txBody>
+          <a:bodyPr rtlCol="0" anchor="ctr"/>
+          <a:lstStyle/>
+          <a:p>
+            <a:pPr algn="ctr"/>
+            <a:r>
+              <a:rPr kumimoji="1" lang="en-US" altLang="ko-KR" sz="1200" dirty="0" smtClean="0">
+                <a:solidFill>
+                  <a:schemeClr val="tx1"/>
+                </a:solidFill>
+              </a:rPr>
+              <a:t>collected items</a:t>
+            </a:r>
+            <a:endParaRPr kumimoji="1" lang="ko-KR" altLang="en-US" sz="1200" dirty="0">
+              <a:solidFill>
+                <a:schemeClr val="tx1"/>
+              </a:solidFill>
+            </a:endParaRPr>
+          </a:p>
+        </p:txBody>
+      </p:sp>
+    </p:spTree>
+    <p:extLst>
+      <p:ext uri="{BB962C8B-B14F-4D97-AF65-F5344CB8AC3E}">
+        <p14:creationId xmlns:p14="http://schemas.microsoft.com/office/powerpoint/2010/main" val="491172316"/>
+      </p:ext>
+    </p:extLst>
+  </p:cSld>
+  <p:clrMapOvr>
+    <a:masterClrMapping/>
+  </p:clrMapOvr>
+</p:sld>
+</file>
+
+<file path=ppt/slides/slide5.xml><?xml version="1.0" encoding="utf-8"?>
+<p:sld xmlns:a="http://schemas.openxmlformats.org/drawingml/2006/main" xmlns:r="http://schemas.openxmlformats.org/officeDocument/2006/relationships" xmlns:p="http://schemas.openxmlformats.org/presentationml/2006/main">
+  <p:cSld>
+    <p:spTree>
+      <p:nvGrpSpPr>
+        <p:cNvPr id="1" name=""/>
+        <p:cNvGrpSpPr/>
+        <p:nvPr/>
+      </p:nvGrpSpPr>
+      <p:grpSpPr>
+        <a:xfrm>
+          <a:off x="0" y="0"/>
+          <a:ext cx="0" cy="0"/>
+          <a:chOff x="0" y="0"/>
+          <a:chExt cx="0" cy="0"/>
+        </a:xfrm>
+      </p:grpSpPr>
+      <p:pic>
+        <p:nvPicPr>
+          <p:cNvPr id="4" name="그림 3"/>
+          <p:cNvPicPr>
+            <a:picLocks noChangeAspect="1"/>
+          </p:cNvPicPr>
+          <p:nvPr/>
+        </p:nvPicPr>
+        <p:blipFill>
+          <a:blip r:embed="rId2">
+            <a:extLst>
+              <a:ext uri="{28A0092B-C50C-407E-A947-70E740481C1C}">
+                <a14:useLocalDpi xmlns:a14="http://schemas.microsoft.com/office/drawing/2010/main" val="0"/>
+              </a:ext>
+            </a:extLst>
+          </a:blip>
+          <a:stretch>
+            <a:fillRect/>
+          </a:stretch>
+        </p:blipFill>
+        <p:spPr>
+          <a:xfrm>
+            <a:off x="819604" y="941614"/>
+            <a:ext cx="4648200" cy="3200400"/>
+          </a:xfrm>
+          <a:prstGeom prst="rect">
+            <a:avLst/>
+          </a:prstGeom>
+        </p:spPr>
+      </p:pic>
+      <p:pic>
+        <p:nvPicPr>
+          <p:cNvPr id="5" name="그림 4"/>
+          <p:cNvPicPr>
+            <a:picLocks noChangeAspect="1"/>
+          </p:cNvPicPr>
+          <p:nvPr/>
+        </p:nvPicPr>
+        <p:blipFill>
+          <a:blip r:embed="rId3">
+            <a:extLst>
+              <a:ext uri="{28A0092B-C50C-407E-A947-70E740481C1C}">
+                <a14:useLocalDpi xmlns:a14="http://schemas.microsoft.com/office/drawing/2010/main" val="0"/>
+              </a:ext>
+            </a:extLst>
+          </a:blip>
+          <a:stretch>
+            <a:fillRect/>
+          </a:stretch>
+        </p:blipFill>
+        <p:spPr>
+          <a:xfrm>
+            <a:off x="6439354" y="947057"/>
+            <a:ext cx="4838700" cy="3200400"/>
+          </a:xfrm>
+          <a:prstGeom prst="rect">
+            <a:avLst/>
+          </a:prstGeom>
+        </p:spPr>
+      </p:pic>
+      <p:sp>
+        <p:nvSpPr>
+          <p:cNvPr id="9" name="직사각형 8"/>
+          <p:cNvSpPr/>
+          <p:nvPr/>
+        </p:nvSpPr>
+        <p:spPr>
+          <a:xfrm>
+            <a:off x="1695904" y="4142014"/>
+            <a:ext cx="2895600" cy="293914"/>
+          </a:xfrm>
+          <a:prstGeom prst="rect">
+            <a:avLst/>
+          </a:prstGeom>
+          <a:solidFill>
+            <a:schemeClr val="bg1"/>
+          </a:solidFill>
+          <a:ln>
+            <a:noFill/>
+          </a:ln>
+        </p:spPr>
+        <p:style>
+          <a:lnRef idx="2">
+            <a:schemeClr val="accent1">
+              <a:shade val="50000"/>
+            </a:schemeClr>
+          </a:lnRef>
+          <a:fillRef idx="1">
+            <a:schemeClr val="accent1"/>
+          </a:fillRef>
+          <a:effectRef idx="0">
+            <a:schemeClr val="accent1"/>
+          </a:effectRef>
+          <a:fontRef idx="minor">
+            <a:schemeClr val="lt1"/>
+          </a:fontRef>
+        </p:style>
+        <p:txBody>
+          <a:bodyPr rtlCol="0" anchor="ctr"/>
+          <a:lstStyle/>
+          <a:p>
+            <a:pPr algn="ctr"/>
+            <a:r>
+              <a:rPr kumimoji="1" lang="en-US" altLang="ko-KR" sz="1200" smtClean="0">
+                <a:solidFill>
+                  <a:schemeClr val="tx1"/>
+                </a:solidFill>
+              </a:rPr>
+              <a:t>threshold</a:t>
+            </a:r>
+            <a:endParaRPr kumimoji="1" lang="ko-KR" altLang="en-US" sz="1200" dirty="0">
+              <a:solidFill>
+                <a:schemeClr val="tx1"/>
+              </a:solidFill>
+            </a:endParaRPr>
+          </a:p>
+        </p:txBody>
+      </p:sp>
+      <p:sp>
+        <p:nvSpPr>
+          <p:cNvPr id="10" name="직사각형 9"/>
+          <p:cNvSpPr/>
+          <p:nvPr/>
+        </p:nvSpPr>
+        <p:spPr>
+          <a:xfrm>
+            <a:off x="7410904" y="4142014"/>
+            <a:ext cx="2895600" cy="293914"/>
+          </a:xfrm>
+          <a:prstGeom prst="rect">
+            <a:avLst/>
+          </a:prstGeom>
+          <a:solidFill>
+            <a:schemeClr val="bg1"/>
+          </a:solidFill>
+          <a:ln>
+            <a:noFill/>
+          </a:ln>
+        </p:spPr>
+        <p:style>
+          <a:lnRef idx="2">
+            <a:schemeClr val="accent1">
+              <a:shade val="50000"/>
+            </a:schemeClr>
+          </a:lnRef>
+          <a:fillRef idx="1">
+            <a:schemeClr val="accent1"/>
+          </a:fillRef>
+          <a:effectRef idx="0">
+            <a:schemeClr val="accent1"/>
+          </a:effectRef>
+          <a:fontRef idx="minor">
+            <a:schemeClr val="lt1"/>
+          </a:fontRef>
+        </p:style>
+        <p:txBody>
+          <a:bodyPr rtlCol="0" anchor="ctr"/>
+          <a:lstStyle/>
+          <a:p>
+            <a:pPr algn="ctr"/>
+            <a:r>
+              <a:rPr kumimoji="1" lang="en-US" altLang="ko-KR" sz="1200" smtClean="0">
+                <a:solidFill>
+                  <a:schemeClr val="tx1"/>
+                </a:solidFill>
+              </a:rPr>
+              <a:t>threshold</a:t>
+            </a:r>
+            <a:endParaRPr kumimoji="1" lang="ko-KR" altLang="en-US" sz="1200" dirty="0">
+              <a:solidFill>
+                <a:schemeClr val="tx1"/>
+              </a:solidFill>
+            </a:endParaRPr>
+          </a:p>
+        </p:txBody>
+      </p:sp>
+    </p:spTree>
+    <p:extLst>
+      <p:ext uri="{BB962C8B-B14F-4D97-AF65-F5344CB8AC3E}">
+        <p14:creationId xmlns:p14="http://schemas.microsoft.com/office/powerpoint/2010/main" val="865374344"/>
+      </p:ext>
+    </p:extLst>
+  </p:cSld>
+  <p:clrMapOvr>
+    <a:masterClrMapping/>
+  </p:clrMapOvr>
+</p:sld>
+</file>
+
+<file path=ppt/slides/slide6.xml><?xml version="1.0" encoding="utf-8"?>
+<p:sld xmlns:a="http://schemas.openxmlformats.org/drawingml/2006/main" xmlns:r="http://schemas.openxmlformats.org/officeDocument/2006/relationships" xmlns:p="http://schemas.openxmlformats.org/presentationml/2006/main">
+  <p:cSld>
+    <p:spTree>
+      <p:nvGrpSpPr>
+        <p:cNvPr id="1" name=""/>
+        <p:cNvGrpSpPr/>
+        <p:nvPr/>
+      </p:nvGrpSpPr>
+      <p:grpSpPr>
+        <a:xfrm>
+          <a:off x="0" y="0"/>
+          <a:ext cx="0" cy="0"/>
+          <a:chOff x="0" y="0"/>
+          <a:chExt cx="0" cy="0"/>
+        </a:xfrm>
+      </p:grpSpPr>
+      <p:pic>
+        <p:nvPicPr>
+          <p:cNvPr id="4" name="그림 3"/>
+          <p:cNvPicPr>
+            <a:picLocks noChangeAspect="1"/>
+          </p:cNvPicPr>
+          <p:nvPr/>
+        </p:nvPicPr>
+        <p:blipFill>
+          <a:blip r:embed="rId2">
+            <a:extLst>
+              <a:ext uri="{28A0092B-C50C-407E-A947-70E740481C1C}">
+                <a14:useLocalDpi xmlns:a14="http://schemas.microsoft.com/office/drawing/2010/main" val="0"/>
+              </a:ext>
+            </a:extLst>
+          </a:blip>
+          <a:stretch>
+            <a:fillRect/>
+          </a:stretch>
+        </p:blipFill>
+        <p:spPr>
+          <a:xfrm>
+            <a:off x="6493329" y="1382486"/>
+            <a:ext cx="4800600" cy="3200400"/>
+          </a:xfrm>
+          <a:prstGeom prst="rect">
+            <a:avLst/>
+          </a:prstGeom>
+        </p:spPr>
+      </p:pic>
+      <p:pic>
+        <p:nvPicPr>
+          <p:cNvPr id="5" name="그림 4"/>
+          <p:cNvPicPr>
+            <a:picLocks noChangeAspect="1"/>
+          </p:cNvPicPr>
+          <p:nvPr/>
+        </p:nvPicPr>
+        <p:blipFill>
+          <a:blip r:embed="rId3">
+            <a:extLst>
+              <a:ext uri="{28A0092B-C50C-407E-A947-70E740481C1C}">
+                <a14:useLocalDpi xmlns:a14="http://schemas.microsoft.com/office/drawing/2010/main" val="0"/>
+              </a:ext>
+            </a:extLst>
+          </a:blip>
+          <a:stretch>
+            <a:fillRect/>
+          </a:stretch>
+        </p:blipFill>
+        <p:spPr>
+          <a:xfrm>
+            <a:off x="685800" y="1382486"/>
+            <a:ext cx="4800600" cy="3200400"/>
+          </a:xfrm>
+          <a:prstGeom prst="rect">
+            <a:avLst/>
+          </a:prstGeom>
+        </p:spPr>
+      </p:pic>
+      <p:sp>
+        <p:nvSpPr>
+          <p:cNvPr id="6" name="직사각형 5"/>
+          <p:cNvSpPr/>
+          <p:nvPr/>
+        </p:nvSpPr>
+        <p:spPr>
+          <a:xfrm>
+            <a:off x="1815193" y="4582886"/>
+            <a:ext cx="2895600" cy="293914"/>
+          </a:xfrm>
+          <a:prstGeom prst="rect">
+            <a:avLst/>
+          </a:prstGeom>
+          <a:solidFill>
+            <a:schemeClr val="bg1"/>
+          </a:solidFill>
+          <a:ln>
+            <a:noFill/>
+          </a:ln>
+        </p:spPr>
+        <p:style>
+          <a:lnRef idx="2">
+            <a:schemeClr val="accent1">
+              <a:shade val="50000"/>
+            </a:schemeClr>
+          </a:lnRef>
+          <a:fillRef idx="1">
+            <a:schemeClr val="accent1"/>
+          </a:fillRef>
+          <a:effectRef idx="0">
+            <a:schemeClr val="accent1"/>
+          </a:effectRef>
+          <a:fontRef idx="minor">
+            <a:schemeClr val="lt1"/>
+          </a:fontRef>
+        </p:style>
+        <p:txBody>
+          <a:bodyPr rtlCol="0" anchor="ctr"/>
+          <a:lstStyle/>
+          <a:p>
+            <a:pPr algn="ctr"/>
+            <a:r>
+              <a:rPr kumimoji="1" lang="en-US" altLang="ko-KR" sz="1200" smtClean="0">
+                <a:solidFill>
+                  <a:schemeClr val="tx1"/>
+                </a:solidFill>
+              </a:rPr>
+              <a:t>threshold</a:t>
+            </a:r>
+            <a:endParaRPr kumimoji="1" lang="ko-KR" altLang="en-US" sz="1200" dirty="0">
+              <a:solidFill>
+                <a:schemeClr val="tx1"/>
+              </a:solidFill>
+            </a:endParaRPr>
+          </a:p>
+        </p:txBody>
+      </p:sp>
+      <p:sp>
+        <p:nvSpPr>
+          <p:cNvPr id="7" name="직사각형 6"/>
+          <p:cNvSpPr/>
+          <p:nvPr/>
+        </p:nvSpPr>
+        <p:spPr>
+          <a:xfrm>
+            <a:off x="7445829" y="4582886"/>
+            <a:ext cx="2895600" cy="293914"/>
+          </a:xfrm>
+          <a:prstGeom prst="rect">
+            <a:avLst/>
+          </a:prstGeom>
+          <a:solidFill>
+            <a:schemeClr val="bg1"/>
+          </a:solidFill>
+          <a:ln>
+            <a:noFill/>
+          </a:ln>
+        </p:spPr>
+        <p:style>
+          <a:lnRef idx="2">
+            <a:schemeClr val="accent1">
+              <a:shade val="50000"/>
+            </a:schemeClr>
+          </a:lnRef>
+          <a:fillRef idx="1">
+            <a:schemeClr val="accent1"/>
+          </a:fillRef>
+          <a:effectRef idx="0">
+            <a:schemeClr val="accent1"/>
+          </a:effectRef>
+          <a:fontRef idx="minor">
+            <a:schemeClr val="lt1"/>
+          </a:fontRef>
+        </p:style>
+        <p:txBody>
+          <a:bodyPr rtlCol="0" anchor="ctr"/>
+          <a:lstStyle/>
+          <a:p>
+            <a:pPr algn="ctr"/>
+            <a:r>
+              <a:rPr kumimoji="1" lang="en-US" altLang="ko-KR" sz="1200" smtClean="0">
+                <a:solidFill>
+                  <a:schemeClr val="tx1"/>
+                </a:solidFill>
+              </a:rPr>
+              <a:t>threshold</a:t>
+            </a:r>
+            <a:endParaRPr kumimoji="1" lang="ko-KR" altLang="en-US" sz="1200" dirty="0">
+              <a:solidFill>
+                <a:schemeClr val="tx1"/>
+              </a:solidFill>
+            </a:endParaRPr>
+          </a:p>
+        </p:txBody>
+      </p:sp>
+    </p:spTree>
+    <p:extLst>
+      <p:ext uri="{BB962C8B-B14F-4D97-AF65-F5344CB8AC3E}">
+        <p14:creationId xmlns:p14="http://schemas.microsoft.com/office/powerpoint/2010/main" val="539770611"/>
+      </p:ext>
+    </p:extLst>
+  </p:cSld>
+  <p:clrMapOvr>
+    <a:masterClrMapping/>
+  </p:clrMapOvr>
+</p:sld>
+</file>
+
 <file path=ppt/theme/theme1.xml><?xml version="1.0" encoding="utf-8"?>
 <a:theme xmlns:a="http://schemas.openxmlformats.org/drawingml/2006/main" name="Office 테마">
   <a:themeElements>

</xml_diff>